<commit_message>
type sys slides bugs
</commit_message>
<xml_diff>
--- a/assets/ppt/semantics/types.pptx
+++ b/assets/ppt/semantics/types.pptx
@@ -37594,22 +37594,30 @@
               </a:lnSpc>
             </a:pPr>
             <a:r>
-              <a:rPr lang="en-US"/>
-              <a:t>Check equivalence of type exprs: </a:t>
-            </a:r>
-            <a:r>
-              <a:rPr lang="en-US" i="1"/>
+              <a:rPr lang="en-US" dirty="0"/>
+              <a:t>Check equivalence of type </a:t>
+            </a:r>
+            <a:r>
+              <a:rPr lang="en-US" dirty="0" err="1"/>
+              <a:t>exprs</a:t>
+            </a:r>
+            <a:r>
+              <a:rPr lang="en-US" dirty="0"/>
+              <a:t>: </a:t>
+            </a:r>
+            <a:r>
+              <a:rPr lang="en-US" i="1" dirty="0"/>
               <a:t>s</a:t>
             </a:r>
             <a:r>
-              <a:rPr lang="en-US"/>
+              <a:rPr lang="en-US" dirty="0"/>
               <a:t> and </a:t>
             </a:r>
             <a:r>
-              <a:rPr lang="en-US" i="1"/>
+              <a:rPr lang="en-US" i="1" dirty="0"/>
               <a:t>t</a:t>
             </a:r>
-            <a:endParaRPr lang="en-US"/>
+            <a:endParaRPr lang="en-US" dirty="0"/>
           </a:p>
           <a:p>
             <a:pPr>
@@ -37618,23 +37626,23 @@
               </a:lnSpc>
             </a:pPr>
             <a:r>
-              <a:rPr lang="en-US"/>
+              <a:rPr lang="en-US" dirty="0"/>
               <a:t>If </a:t>
             </a:r>
             <a:r>
-              <a:rPr lang="en-US" i="1"/>
+              <a:rPr lang="en-US" i="1" dirty="0"/>
               <a:t>s</a:t>
             </a:r>
             <a:r>
-              <a:rPr lang="en-US"/>
+              <a:rPr lang="en-US" dirty="0"/>
               <a:t> and </a:t>
             </a:r>
             <a:r>
-              <a:rPr lang="en-US" i="1"/>
+              <a:rPr lang="en-US" i="1" dirty="0"/>
               <a:t>t</a:t>
             </a:r>
             <a:r>
-              <a:rPr lang="en-US"/>
+              <a:rPr lang="en-US" dirty="0"/>
               <a:t> are basic types, then return true</a:t>
             </a:r>
           </a:p>
@@ -37645,95 +37653,111 @@
               </a:lnSpc>
             </a:pPr>
             <a:r>
-              <a:rPr lang="en-US"/>
+              <a:rPr lang="en-US" dirty="0"/>
               <a:t>If </a:t>
             </a:r>
             <a:r>
-              <a:rPr lang="en-US" i="1"/>
+              <a:rPr lang="en-US" i="1" dirty="0"/>
               <a:t>s = array(s</a:t>
             </a:r>
             <a:r>
-              <a:rPr lang="en-US" i="1" baseline="-25000"/>
+              <a:rPr lang="en-US" i="1" baseline="-25000" dirty="0"/>
               <a:t>1</a:t>
             </a:r>
             <a:r>
-              <a:rPr lang="en-US" i="1"/>
+              <a:rPr lang="en-US" i="1" dirty="0"/>
               <a:t>, s</a:t>
             </a:r>
             <a:r>
-              <a:rPr lang="en-US" i="1" baseline="-25000"/>
+              <a:rPr lang="en-US" i="1" baseline="-25000" dirty="0"/>
               <a:t>2</a:t>
             </a:r>
             <a:r>
-              <a:rPr lang="en-US" i="1"/>
+              <a:rPr lang="en-US" i="1" dirty="0"/>
               <a:t>)</a:t>
             </a:r>
             <a:r>
-              <a:rPr lang="en-US"/>
+              <a:rPr lang="en-US" dirty="0"/>
               <a:t> and </a:t>
             </a:r>
             <a:r>
-              <a:rPr lang="en-US" i="1"/>
+              <a:rPr lang="en-US" i="1" dirty="0"/>
               <a:t>t = array(t</a:t>
             </a:r>
             <a:r>
-              <a:rPr lang="en-US" i="1" baseline="-25000"/>
+              <a:rPr lang="en-US" i="1" baseline="-25000" dirty="0"/>
               <a:t>1</a:t>
             </a:r>
             <a:r>
-              <a:rPr lang="en-US" i="1"/>
+              <a:rPr lang="en-US" i="1" dirty="0"/>
               <a:t>, t</a:t>
             </a:r>
             <a:r>
-              <a:rPr lang="en-US" i="1" baseline="-25000"/>
+              <a:rPr lang="en-US" i="1" baseline="-25000" dirty="0"/>
               <a:t>2</a:t>
             </a:r>
             <a:r>
-              <a:rPr lang="en-US" i="1"/>
+              <a:rPr lang="en-US" i="1" dirty="0"/>
               <a:t>)</a:t>
             </a:r>
             <a:r>
-              <a:rPr lang="en-US"/>
+              <a:rPr lang="en-US" dirty="0"/>
               <a:t> then return true if equal(</a:t>
             </a:r>
             <a:r>
-              <a:rPr lang="en-US" i="1"/>
+              <a:rPr lang="en-US" i="1" dirty="0"/>
               <a:t>s</a:t>
             </a:r>
             <a:r>
-              <a:rPr lang="en-US" i="1" baseline="-25000"/>
+              <a:rPr lang="en-US" i="1" baseline="-25000" dirty="0"/>
               <a:t>1</a:t>
             </a:r>
             <a:r>
-              <a:rPr lang="en-US" i="1"/>
-              <a:t>, t</a:t>
-            </a:r>
-            <a:r>
-              <a:rPr lang="en-US" i="1" baseline="-25000"/>
+              <a:rPr lang="en-US" i="1" dirty="0"/>
+              <a:t>, </a:t>
+            </a:r>
+            <a:r>
+              <a:rPr lang="en-US" i="1" dirty="0" smtClean="0"/>
+              <a:t>s</a:t>
+            </a:r>
+            <a:r>
+              <a:rPr lang="en-US" i="1" baseline="-25000" dirty="0"/>
+              <a:t>2</a:t>
+            </a:r>
+            <a:r>
+              <a:rPr lang="en-US" dirty="0" smtClean="0"/>
+              <a:t>) </a:t>
+            </a:r>
+            <a:r>
+              <a:rPr lang="en-US" dirty="0"/>
+              <a:t>and equal</a:t>
+            </a:r>
+            <a:r>
+              <a:rPr lang="en-US" dirty="0" smtClean="0"/>
+              <a:t>(</a:t>
+            </a:r>
+            <a:r>
+              <a:rPr lang="en-US" i="1" dirty="0" smtClean="0"/>
+              <a:t>t</a:t>
+            </a:r>
+            <a:r>
+              <a:rPr lang="en-US" i="1" baseline="-25000" dirty="0" smtClean="0"/>
               <a:t>1</a:t>
             </a:r>
             <a:r>
-              <a:rPr lang="en-US"/>
-              <a:t>) and equal(</a:t>
-            </a:r>
-            <a:r>
-              <a:rPr lang="en-US" i="1"/>
-              <a:t>s</a:t>
-            </a:r>
-            <a:r>
-              <a:rPr lang="en-US" i="1" baseline="-25000"/>
+              <a:rPr lang="en-US" i="1" dirty="0" smtClean="0"/>
+              <a:t>, </a:t>
+            </a:r>
+            <a:r>
+              <a:rPr lang="en-US" i="1" dirty="0"/>
+              <a:t>t</a:t>
+            </a:r>
+            <a:r>
+              <a:rPr lang="en-US" i="1" baseline="-25000" dirty="0"/>
               <a:t>2</a:t>
             </a:r>
             <a:r>
-              <a:rPr lang="en-US" i="1"/>
-              <a:t>, t</a:t>
-            </a:r>
-            <a:r>
-              <a:rPr lang="en-US" i="1" baseline="-25000"/>
-              <a:t>2</a:t>
-            </a:r>
-            <a:r>
-              <a:rPr lang="en-US"/>
+              <a:rPr lang="en-US" dirty="0"/>
               <a:t>)</a:t>
             </a:r>
           </a:p>
@@ -37744,111 +37768,127 @@
               </a:lnSpc>
             </a:pPr>
             <a:r>
-              <a:rPr lang="en-US"/>
+              <a:rPr lang="en-US" dirty="0"/>
               <a:t>If s = </a:t>
             </a:r>
             <a:r>
-              <a:rPr lang="en-US" i="1"/>
+              <a:rPr lang="en-US" i="1" dirty="0"/>
               <a:t>s</a:t>
             </a:r>
             <a:r>
-              <a:rPr lang="en-US" i="1" baseline="-25000"/>
+              <a:rPr lang="en-US" i="1" baseline="-25000" dirty="0"/>
               <a:t>1</a:t>
             </a:r>
             <a:r>
-              <a:rPr lang="en-US" i="1"/>
+              <a:rPr lang="en-US" i="1" dirty="0"/>
               <a:t> </a:t>
             </a:r>
             <a:r>
-              <a:rPr lang="en-US" i="1">
+              <a:rPr lang="en-US" i="1" dirty="0">
                 <a:sym typeface="Symbol" charset="2"/>
               </a:rPr>
               <a:t> s</a:t>
             </a:r>
             <a:r>
-              <a:rPr lang="en-US" i="1" baseline="-25000">
+              <a:rPr lang="en-US" i="1" baseline="-25000" dirty="0">
                 <a:sym typeface="Symbol" charset="2"/>
               </a:rPr>
               <a:t>2</a:t>
             </a:r>
             <a:r>
-              <a:rPr lang="en-US">
+              <a:rPr lang="en-US" dirty="0">
                 <a:sym typeface="Symbol" charset="2"/>
               </a:rPr>
               <a:t> and </a:t>
             </a:r>
             <a:r>
-              <a:rPr lang="en-US" i="1">
+              <a:rPr lang="en-US" i="1" dirty="0">
                 <a:sym typeface="Symbol" charset="2"/>
               </a:rPr>
               <a:t>t = t</a:t>
             </a:r>
             <a:r>
-              <a:rPr lang="en-US" i="1" baseline="-25000">
+              <a:rPr lang="en-US" i="1" baseline="-25000" dirty="0">
                 <a:sym typeface="Symbol" charset="2"/>
               </a:rPr>
               <a:t>1 </a:t>
             </a:r>
             <a:r>
-              <a:rPr lang="en-US" i="1">
+              <a:rPr lang="en-US" i="1" dirty="0">
                 <a:sym typeface="Symbol" charset="2"/>
               </a:rPr>
               <a:t> t</a:t>
             </a:r>
             <a:r>
-              <a:rPr lang="en-US" i="1" baseline="-25000">
+              <a:rPr lang="en-US" i="1" baseline="-25000" dirty="0">
                 <a:sym typeface="Symbol" charset="2"/>
               </a:rPr>
               <a:t>2</a:t>
             </a:r>
             <a:r>
-              <a:rPr lang="en-US">
+              <a:rPr lang="en-US" dirty="0">
                 <a:sym typeface="Symbol" charset="2"/>
               </a:rPr>
               <a:t> then return true </a:t>
             </a:r>
             <a:r>
-              <a:rPr lang="en-US"/>
+              <a:rPr lang="en-US" dirty="0"/>
               <a:t>if equal(</a:t>
             </a:r>
             <a:r>
-              <a:rPr lang="en-US" i="1"/>
+              <a:rPr lang="en-US" i="1" dirty="0"/>
               <a:t>s</a:t>
             </a:r>
             <a:r>
-              <a:rPr lang="en-US" i="1" baseline="-25000"/>
+              <a:rPr lang="en-US" i="1" baseline="-25000" dirty="0"/>
               <a:t>1</a:t>
             </a:r>
             <a:r>
-              <a:rPr lang="en-US" i="1"/>
-              <a:t>, t</a:t>
-            </a:r>
-            <a:r>
-              <a:rPr lang="en-US" i="1" baseline="-25000"/>
+              <a:rPr lang="en-US" i="1" dirty="0"/>
+              <a:t>, </a:t>
+            </a:r>
+            <a:r>
+              <a:rPr lang="en-US" i="1" dirty="0" smtClean="0"/>
+              <a:t>s</a:t>
+            </a:r>
+            <a:r>
+              <a:rPr lang="en-US" i="1" baseline="-25000" dirty="0" smtClean="0"/>
+              <a:t>2</a:t>
+            </a:r>
+            <a:r>
+              <a:rPr lang="en-US" dirty="0" smtClean="0"/>
+              <a:t>) </a:t>
+            </a:r>
+            <a:r>
+              <a:rPr lang="en-US" dirty="0"/>
+              <a:t>and equal</a:t>
+            </a:r>
+            <a:r>
+              <a:rPr lang="en-US" smtClean="0"/>
+              <a:t>(</a:t>
+            </a:r>
+            <a:r>
+              <a:rPr lang="en-US" i="1" smtClean="0"/>
+              <a:t>t</a:t>
+            </a:r>
+            <a:r>
+              <a:rPr lang="en-US" i="1" baseline="-25000" smtClean="0"/>
               <a:t>1</a:t>
             </a:r>
             <a:r>
-              <a:rPr lang="en-US"/>
-              <a:t>) and equal(</a:t>
-            </a:r>
-            <a:r>
-              <a:rPr lang="en-US" i="1"/>
-              <a:t>s</a:t>
-            </a:r>
-            <a:r>
-              <a:rPr lang="en-US" i="1" baseline="-25000"/>
+              <a:rPr lang="en-US" i="1" smtClean="0"/>
+              <a:t>, </a:t>
+            </a:r>
+            <a:r>
+              <a:rPr lang="en-US" i="1" dirty="0"/>
+              <a:t>t</a:t>
+            </a:r>
+            <a:r>
+              <a:rPr lang="en-US" i="1" baseline="-25000" dirty="0"/>
               <a:t>2</a:t>
             </a:r>
             <a:r>
-              <a:rPr lang="en-US" i="1"/>
-              <a:t>, t</a:t>
-            </a:r>
-            <a:r>
-              <a:rPr lang="en-US" i="1" baseline="-25000"/>
-              <a:t>2</a:t>
-            </a:r>
-            <a:r>
-              <a:rPr lang="en-US"/>
+              <a:rPr lang="en-US" dirty="0"/>
               <a:t>)</a:t>
             </a:r>
           </a:p>
@@ -37859,62 +37899,62 @@
               </a:lnSpc>
             </a:pPr>
             <a:r>
-              <a:rPr lang="en-US"/>
+              <a:rPr lang="en-US" dirty="0"/>
               <a:t>If </a:t>
             </a:r>
             <a:r>
-              <a:rPr lang="en-US" i="1"/>
+              <a:rPr lang="en-US" i="1" dirty="0"/>
               <a:t>s = pointer(s</a:t>
             </a:r>
             <a:r>
-              <a:rPr lang="en-US" i="1" baseline="-25000"/>
+              <a:rPr lang="en-US" i="1" baseline="-25000" dirty="0"/>
               <a:t>1</a:t>
             </a:r>
             <a:r>
-              <a:rPr lang="en-US" i="1"/>
+              <a:rPr lang="en-US" i="1" dirty="0"/>
               <a:t>)</a:t>
             </a:r>
             <a:r>
-              <a:rPr lang="en-US"/>
+              <a:rPr lang="en-US" dirty="0"/>
               <a:t> and </a:t>
             </a:r>
             <a:r>
-              <a:rPr lang="en-US" i="1"/>
+              <a:rPr lang="en-US" i="1" dirty="0"/>
               <a:t>t = pointer(t</a:t>
             </a:r>
             <a:r>
-              <a:rPr lang="en-US" i="1" baseline="-25000"/>
+              <a:rPr lang="en-US" i="1" baseline="-25000" dirty="0"/>
               <a:t>1</a:t>
             </a:r>
             <a:r>
-              <a:rPr lang="en-US" i="1"/>
+              <a:rPr lang="en-US" i="1" dirty="0"/>
               <a:t>)</a:t>
             </a:r>
             <a:r>
-              <a:rPr lang="en-US"/>
+              <a:rPr lang="en-US" dirty="0"/>
               <a:t> then return true if equal(</a:t>
             </a:r>
             <a:r>
-              <a:rPr lang="en-US" i="1"/>
+              <a:rPr lang="en-US" i="1" dirty="0"/>
               <a:t>s</a:t>
             </a:r>
             <a:r>
-              <a:rPr lang="en-US" i="1" baseline="-25000"/>
+              <a:rPr lang="en-US" i="1" baseline="-25000" dirty="0"/>
               <a:t>1</a:t>
             </a:r>
             <a:r>
-              <a:rPr lang="en-US" i="1"/>
+              <a:rPr lang="en-US" i="1" dirty="0"/>
               <a:t>, t</a:t>
             </a:r>
             <a:r>
-              <a:rPr lang="en-US" i="1" baseline="-25000"/>
+              <a:rPr lang="en-US" i="1" baseline="-25000" dirty="0"/>
               <a:t>1</a:t>
             </a:r>
             <a:r>
-              <a:rPr lang="en-US"/>
+              <a:rPr lang="en-US" dirty="0"/>
               <a:t>)</a:t>
             </a:r>
-            <a:endParaRPr lang="en-US" sz="3600" i="1">
+            <a:endParaRPr lang="en-US" sz="3600" i="1" dirty="0">
               <a:sym typeface="Symbol" charset="2"/>
             </a:endParaRPr>
           </a:p>

</xml_diff>